<commit_message>
Started adding goals as structure
</commit_message>
<xml_diff>
--- a/Documents/Structure.pptx
+++ b/Documents/Structure.pptx
@@ -6,9 +6,11 @@
   </p:sldMasterIdLst>
   <p:sldIdLst>
     <p:sldId id="258" r:id="rId2"/>
-    <p:sldId id="256" r:id="rId3"/>
-    <p:sldId id="259" r:id="rId4"/>
-    <p:sldId id="257" r:id="rId5"/>
+    <p:sldId id="260" r:id="rId3"/>
+    <p:sldId id="261" r:id="rId4"/>
+    <p:sldId id="256" r:id="rId5"/>
+    <p:sldId id="259" r:id="rId6"/>
+    <p:sldId id="257" r:id="rId7"/>
   </p:sldIdLst>
   <p:sldSz cx="12192000" cy="6858000"/>
   <p:notesSz cx="6858000" cy="9144000"/>
@@ -246,7 +248,7 @@
           <a:p>
             <a:fld id="{1C7BAE8E-F25C-4613-8620-6E4584186655}" type="datetimeFigureOut">
               <a:rPr lang="en-US" smtClean="0"/>
-              <a:t>12/7/2017</a:t>
+              <a:t>2/12/2018</a:t>
             </a:fld>
             <a:endParaRPr lang="en-US"/>
           </a:p>
@@ -416,7 +418,7 @@
           <a:p>
             <a:fld id="{1C7BAE8E-F25C-4613-8620-6E4584186655}" type="datetimeFigureOut">
               <a:rPr lang="en-US" smtClean="0"/>
-              <a:t>12/7/2017</a:t>
+              <a:t>2/12/2018</a:t>
             </a:fld>
             <a:endParaRPr lang="en-US"/>
           </a:p>
@@ -596,7 +598,7 @@
           <a:p>
             <a:fld id="{1C7BAE8E-F25C-4613-8620-6E4584186655}" type="datetimeFigureOut">
               <a:rPr lang="en-US" smtClean="0"/>
-              <a:t>12/7/2017</a:t>
+              <a:t>2/12/2018</a:t>
             </a:fld>
             <a:endParaRPr lang="en-US"/>
           </a:p>
@@ -766,7 +768,7 @@
           <a:p>
             <a:fld id="{1C7BAE8E-F25C-4613-8620-6E4584186655}" type="datetimeFigureOut">
               <a:rPr lang="en-US" smtClean="0"/>
-              <a:t>12/7/2017</a:t>
+              <a:t>2/12/2018</a:t>
             </a:fld>
             <a:endParaRPr lang="en-US"/>
           </a:p>
@@ -1012,7 +1014,7 @@
           <a:p>
             <a:fld id="{1C7BAE8E-F25C-4613-8620-6E4584186655}" type="datetimeFigureOut">
               <a:rPr lang="en-US" smtClean="0"/>
-              <a:t>12/7/2017</a:t>
+              <a:t>2/12/2018</a:t>
             </a:fld>
             <a:endParaRPr lang="en-US"/>
           </a:p>
@@ -1244,7 +1246,7 @@
           <a:p>
             <a:fld id="{1C7BAE8E-F25C-4613-8620-6E4584186655}" type="datetimeFigureOut">
               <a:rPr lang="en-US" smtClean="0"/>
-              <a:t>12/7/2017</a:t>
+              <a:t>2/12/2018</a:t>
             </a:fld>
             <a:endParaRPr lang="en-US"/>
           </a:p>
@@ -1611,7 +1613,7 @@
           <a:p>
             <a:fld id="{1C7BAE8E-F25C-4613-8620-6E4584186655}" type="datetimeFigureOut">
               <a:rPr lang="en-US" smtClean="0"/>
-              <a:t>12/7/2017</a:t>
+              <a:t>2/12/2018</a:t>
             </a:fld>
             <a:endParaRPr lang="en-US"/>
           </a:p>
@@ -1729,7 +1731,7 @@
           <a:p>
             <a:fld id="{1C7BAE8E-F25C-4613-8620-6E4584186655}" type="datetimeFigureOut">
               <a:rPr lang="en-US" smtClean="0"/>
-              <a:t>12/7/2017</a:t>
+              <a:t>2/12/2018</a:t>
             </a:fld>
             <a:endParaRPr lang="en-US"/>
           </a:p>
@@ -1824,7 +1826,7 @@
           <a:p>
             <a:fld id="{1C7BAE8E-F25C-4613-8620-6E4584186655}" type="datetimeFigureOut">
               <a:rPr lang="en-US" smtClean="0"/>
-              <a:t>12/7/2017</a:t>
+              <a:t>2/12/2018</a:t>
             </a:fld>
             <a:endParaRPr lang="en-US"/>
           </a:p>
@@ -2101,7 +2103,7 @@
           <a:p>
             <a:fld id="{1C7BAE8E-F25C-4613-8620-6E4584186655}" type="datetimeFigureOut">
               <a:rPr lang="en-US" smtClean="0"/>
-              <a:t>12/7/2017</a:t>
+              <a:t>2/12/2018</a:t>
             </a:fld>
             <a:endParaRPr lang="en-US"/>
           </a:p>
@@ -2354,7 +2356,7 @@
           <a:p>
             <a:fld id="{1C7BAE8E-F25C-4613-8620-6E4584186655}" type="datetimeFigureOut">
               <a:rPr lang="en-US" smtClean="0"/>
-              <a:t>12/7/2017</a:t>
+              <a:t>2/12/2018</a:t>
             </a:fld>
             <a:endParaRPr lang="en-US"/>
           </a:p>
@@ -2567,7 +2569,7 @@
           <a:p>
             <a:fld id="{1C7BAE8E-F25C-4613-8620-6E4584186655}" type="datetimeFigureOut">
               <a:rPr lang="en-US" smtClean="0"/>
-              <a:t>12/7/2017</a:t>
+              <a:t>2/12/2018</a:t>
             </a:fld>
             <a:endParaRPr lang="en-US"/>
           </a:p>
@@ -3885,15 +3887,7 @@
                   <a:schemeClr val="tx1"/>
                 </a:solidFill>
               </a:rPr>
-              <a:t>Pattern </a:t>
-            </a:r>
-            <a:r>
-              <a:rPr lang="en-US" dirty="0" smtClean="0">
-                <a:solidFill>
-                  <a:schemeClr val="tx1"/>
-                </a:solidFill>
-              </a:rPr>
-              <a:t>Sequence (PC, DLP GUI)</a:t>
+              <a:t>Pattern Sequence (PC, DLP GUI)</a:t>
             </a:r>
             <a:endParaRPr lang="en-US" dirty="0">
               <a:solidFill>
@@ -4726,7 +4720,15 @@
                   <a:schemeClr val="tx1"/>
                 </a:solidFill>
               </a:rPr>
-              <a:t>RF Signal</a:t>
+              <a:t>RF </a:t>
+            </a:r>
+            <a:r>
+              <a:rPr lang="en-US" dirty="0" smtClean="0">
+                <a:solidFill>
+                  <a:schemeClr val="tx1"/>
+                </a:solidFill>
+              </a:rPr>
+              <a:t>Signal (?)</a:t>
             </a:r>
             <a:endParaRPr lang="en-US" dirty="0">
               <a:solidFill>
@@ -5605,129 +5607,1165 @@
       </p:grpSpPr>
       <p:sp>
         <p:nvSpPr>
-          <p:cNvPr id="5" name="TextBox 4"/>
-          <p:cNvSpPr txBox="1"/>
+          <p:cNvPr id="69" name="Rounded Rectangle 68"/>
+          <p:cNvSpPr/>
           <p:nvPr/>
         </p:nvSpPr>
         <p:spPr>
           <a:xfrm>
-            <a:off x="1130245" y="2884481"/>
-            <a:ext cx="2106154" cy="2862322"/>
-          </a:xfrm>
-          <a:prstGeom prst="rect">
+            <a:off x="1284581" y="1219200"/>
+            <a:ext cx="9827100" cy="5249330"/>
+          </a:xfrm>
+          <a:prstGeom prst="roundRect">
             <a:avLst/>
           </a:prstGeom>
-          <a:noFill/>
-        </p:spPr>
-        <p:txBody>
-          <a:bodyPr wrap="none" rtlCol="0">
-            <a:spAutoFit/>
-          </a:bodyPr>
-          <a:lstStyle/>
-          <a:p>
-            <a:r>
-              <a:rPr lang="en-US" b="1" u="sng" dirty="0" smtClean="0"/>
-              <a:t>User Input (?)</a:t>
-            </a:r>
-          </a:p>
-          <a:p>
-            <a:pPr marL="285750" indent="-285750">
-              <a:buFontTx/>
-              <a:buChar char="-"/>
-            </a:pPr>
+          <a:solidFill>
+            <a:schemeClr val="bg1"/>
+          </a:solidFill>
+          <a:ln w="76200">
+            <a:solidFill>
+              <a:schemeClr val="tx1"/>
+            </a:solidFill>
+          </a:ln>
+        </p:spPr>
+        <p:style>
+          <a:lnRef idx="2">
+            <a:schemeClr val="accent5">
+              <a:shade val="50000"/>
+            </a:schemeClr>
+          </a:lnRef>
+          <a:fillRef idx="1">
+            <a:schemeClr val="accent5"/>
+          </a:fillRef>
+          <a:effectRef idx="0">
+            <a:schemeClr val="accent5"/>
+          </a:effectRef>
+          <a:fontRef idx="minor">
+            <a:schemeClr val="lt1"/>
+          </a:fontRef>
+        </p:style>
+        <p:txBody>
+          <a:bodyPr rtlCol="0" anchor="t"/>
+          <a:lstStyle/>
+          <a:p>
+            <a:pPr algn="ctr"/>
+            <a:r>
+              <a:rPr lang="en-US" dirty="0" smtClean="0">
+                <a:solidFill>
+                  <a:schemeClr val="tx1"/>
+                </a:solidFill>
+              </a:rPr>
+              <a:t>Create Firmware </a:t>
+            </a:r>
+            <a:endParaRPr lang="en-US" dirty="0">
+              <a:solidFill>
+                <a:schemeClr val="tx1"/>
+              </a:solidFill>
+            </a:endParaRPr>
+          </a:p>
+        </p:txBody>
+      </p:sp>
+      <p:sp>
+        <p:nvSpPr>
+          <p:cNvPr id="35" name="Rounded Rectangle 34"/>
+          <p:cNvSpPr/>
+          <p:nvPr/>
+        </p:nvSpPr>
+        <p:spPr>
+          <a:xfrm>
+            <a:off x="1559691" y="2045105"/>
+            <a:ext cx="9276880" cy="4167691"/>
+          </a:xfrm>
+          <a:prstGeom prst="roundRect">
+            <a:avLst/>
+          </a:prstGeom>
+          <a:solidFill>
+            <a:schemeClr val="bg1">
+              <a:lumMod val="75000"/>
+            </a:schemeClr>
+          </a:solidFill>
+          <a:ln>
+            <a:noFill/>
+          </a:ln>
+        </p:spPr>
+        <p:style>
+          <a:lnRef idx="2">
+            <a:schemeClr val="accent1">
+              <a:shade val="50000"/>
+            </a:schemeClr>
+          </a:lnRef>
+          <a:fillRef idx="1">
+            <a:schemeClr val="accent1"/>
+          </a:fillRef>
+          <a:effectRef idx="0">
+            <a:schemeClr val="accent1"/>
+          </a:effectRef>
+          <a:fontRef idx="minor">
+            <a:schemeClr val="lt1"/>
+          </a:fontRef>
+        </p:style>
+        <p:txBody>
+          <a:bodyPr rtlCol="0" anchor="t"/>
+          <a:lstStyle/>
+          <a:p>
+            <a:endParaRPr lang="en-US" dirty="0">
+              <a:solidFill>
+                <a:schemeClr val="tx1"/>
+              </a:solidFill>
+            </a:endParaRPr>
+          </a:p>
+        </p:txBody>
+      </p:sp>
+      <p:sp>
+        <p:nvSpPr>
+          <p:cNvPr id="2" name="Title 1"/>
+          <p:cNvSpPr>
+            <a:spLocks noGrp="1"/>
+          </p:cNvSpPr>
+          <p:nvPr>
+            <p:ph type="title"/>
+          </p:nvPr>
+        </p:nvSpPr>
+        <p:spPr>
+          <a:xfrm>
+            <a:off x="320971" y="52413"/>
+            <a:ext cx="10515600" cy="1325563"/>
+          </a:xfrm>
+        </p:spPr>
+        <p:txBody>
+          <a:bodyPr/>
+          <a:lstStyle/>
+          <a:p>
             <a:r>
               <a:rPr lang="en-US" dirty="0" smtClean="0"/>
-              <a:t>Touch</a:t>
-            </a:r>
-            <a:endParaRPr lang="en-US" dirty="0"/>
-          </a:p>
-          <a:p>
-            <a:pPr marL="285750" indent="-285750">
-              <a:buFontTx/>
-              <a:buChar char="-"/>
-            </a:pPr>
-            <a:r>
-              <a:rPr lang="en-US" dirty="0" smtClean="0"/>
-              <a:t>Movement</a:t>
-            </a:r>
-          </a:p>
-          <a:p>
-            <a:pPr marL="742950" lvl="1" indent="-285750">
-              <a:buFontTx/>
-              <a:buChar char="-"/>
-            </a:pPr>
-            <a:r>
-              <a:rPr lang="en-US" dirty="0" smtClean="0"/>
-              <a:t>Planar</a:t>
-            </a:r>
-          </a:p>
-          <a:p>
-            <a:pPr marL="742950" lvl="1" indent="-285750">
-              <a:buFontTx/>
-              <a:buChar char="-"/>
-            </a:pPr>
-            <a:r>
-              <a:rPr lang="en-US" dirty="0" smtClean="0"/>
-              <a:t>Orthogonal</a:t>
-            </a:r>
-            <a:endParaRPr lang="en-US" dirty="0"/>
-          </a:p>
-          <a:p>
-            <a:pPr marL="285750" indent="-285750">
-              <a:buFontTx/>
-              <a:buChar char="-"/>
-            </a:pPr>
-            <a:r>
-              <a:rPr lang="en-US" dirty="0" smtClean="0"/>
-              <a:t>External UI</a:t>
-            </a:r>
-          </a:p>
-          <a:p>
-            <a:pPr marL="742950" lvl="1" indent="-285750">
-              <a:buFontTx/>
-              <a:buChar char="-"/>
-            </a:pPr>
-            <a:r>
-              <a:rPr lang="en-US" dirty="0" smtClean="0"/>
-              <a:t>Buttons</a:t>
-            </a:r>
-          </a:p>
-          <a:p>
-            <a:pPr marL="742950" lvl="1" indent="-285750">
-              <a:buFontTx/>
-              <a:buChar char="-"/>
-            </a:pPr>
-            <a:r>
-              <a:rPr lang="en-US" dirty="0" smtClean="0"/>
-              <a:t>Levers</a:t>
-            </a:r>
-          </a:p>
-          <a:p>
-            <a:pPr marL="742950" lvl="1" indent="-285750">
-              <a:buFontTx/>
-              <a:buChar char="-"/>
-            </a:pPr>
-            <a:r>
-              <a:rPr lang="en-US" dirty="0" smtClean="0"/>
-              <a:t>Encoders</a:t>
-            </a:r>
-          </a:p>
-          <a:p>
-            <a:pPr marL="742950" lvl="1" indent="-285750">
-              <a:buFontTx/>
-              <a:buChar char="-"/>
-            </a:pPr>
-            <a:r>
-              <a:rPr lang="en-US" dirty="0" smtClean="0"/>
-              <a:t>Scroll Wheel</a:t>
-            </a:r>
-          </a:p>
-        </p:txBody>
-      </p:sp>
+              <a:t>Replicate Paper – Create Firmware</a:t>
+            </a:r>
+            <a:endParaRPr lang="en-GB" dirty="0"/>
+          </a:p>
+        </p:txBody>
+      </p:sp>
+      <p:sp>
+        <p:nvSpPr>
+          <p:cNvPr id="54" name="Rounded Rectangle 53"/>
+          <p:cNvSpPr/>
+          <p:nvPr/>
+        </p:nvSpPr>
+        <p:spPr>
+          <a:xfrm>
+            <a:off x="5520797" y="3955282"/>
+            <a:ext cx="1354668" cy="792480"/>
+          </a:xfrm>
+          <a:prstGeom prst="roundRect">
+            <a:avLst>
+              <a:gd name="adj" fmla="val 50000"/>
+            </a:avLst>
+          </a:prstGeom>
+          <a:solidFill>
+            <a:schemeClr val="tx1"/>
+          </a:solidFill>
+          <a:ln>
+            <a:noFill/>
+          </a:ln>
+        </p:spPr>
+        <p:style>
+          <a:lnRef idx="1">
+            <a:schemeClr val="accent3"/>
+          </a:lnRef>
+          <a:fillRef idx="2">
+            <a:schemeClr val="accent3"/>
+          </a:fillRef>
+          <a:effectRef idx="1">
+            <a:schemeClr val="accent3"/>
+          </a:effectRef>
+          <a:fontRef idx="minor">
+            <a:schemeClr val="dk1"/>
+          </a:fontRef>
+        </p:style>
+        <p:txBody>
+          <a:bodyPr rtlCol="0" anchor="ctr"/>
+          <a:lstStyle/>
+          <a:p>
+            <a:pPr algn="ctr"/>
+            <a:r>
+              <a:rPr lang="en-US" dirty="0" smtClean="0">
+                <a:ln w="0"/>
+                <a:solidFill>
+                  <a:schemeClr val="bg1"/>
+                </a:solidFill>
+                <a:effectLst>
+                  <a:outerShdw blurRad="38100" dist="19050" dir="2700000" algn="tl" rotWithShape="0">
+                    <a:schemeClr val="dk1">
+                      <a:alpha val="40000"/>
+                    </a:schemeClr>
+                  </a:outerShdw>
+                </a:effectLst>
+              </a:rPr>
+              <a:t>Default</a:t>
+            </a:r>
+            <a:endParaRPr lang="en-US" dirty="0" smtClean="0">
+              <a:ln w="0"/>
+              <a:solidFill>
+                <a:schemeClr val="bg1"/>
+              </a:solidFill>
+              <a:effectLst>
+                <a:outerShdw blurRad="38100" dist="19050" dir="2700000" algn="tl" rotWithShape="0">
+                  <a:schemeClr val="dk1">
+                    <a:alpha val="40000"/>
+                  </a:schemeClr>
+                </a:outerShdw>
+              </a:effectLst>
+            </a:endParaRPr>
+          </a:p>
+          <a:p>
+            <a:pPr algn="ctr"/>
+            <a:r>
+              <a:rPr lang="en-US" dirty="0" smtClean="0">
+                <a:ln w="0"/>
+                <a:solidFill>
+                  <a:schemeClr val="bg1"/>
+                </a:solidFill>
+                <a:effectLst>
+                  <a:outerShdw blurRad="38100" dist="19050" dir="2700000" algn="tl" rotWithShape="0">
+                    <a:schemeClr val="dk1">
+                      <a:alpha val="40000"/>
+                    </a:schemeClr>
+                  </a:outerShdw>
+                </a:effectLst>
+              </a:rPr>
+              <a:t>Firmware</a:t>
+            </a:r>
+            <a:endParaRPr lang="en-US" dirty="0" smtClean="0">
+              <a:ln w="0"/>
+              <a:solidFill>
+                <a:schemeClr val="bg1"/>
+              </a:solidFill>
+              <a:effectLst>
+                <a:outerShdw blurRad="38100" dist="19050" dir="2700000" algn="tl" rotWithShape="0">
+                  <a:schemeClr val="dk1">
+                    <a:alpha val="40000"/>
+                  </a:schemeClr>
+                </a:outerShdw>
+              </a:effectLst>
+            </a:endParaRPr>
+          </a:p>
+        </p:txBody>
+      </p:sp>
+      <p:sp>
+        <p:nvSpPr>
+          <p:cNvPr id="56" name="Rounded Rectangle 55"/>
+          <p:cNvSpPr/>
+          <p:nvPr/>
+        </p:nvSpPr>
+        <p:spPr>
+          <a:xfrm>
+            <a:off x="2173485" y="2417068"/>
+            <a:ext cx="2071437" cy="792480"/>
+          </a:xfrm>
+          <a:prstGeom prst="roundRect">
+            <a:avLst>
+              <a:gd name="adj" fmla="val 50000"/>
+            </a:avLst>
+          </a:prstGeom>
+          <a:solidFill>
+            <a:schemeClr val="tx1"/>
+          </a:solidFill>
+          <a:ln>
+            <a:noFill/>
+          </a:ln>
+        </p:spPr>
+        <p:style>
+          <a:lnRef idx="1">
+            <a:schemeClr val="accent3"/>
+          </a:lnRef>
+          <a:fillRef idx="2">
+            <a:schemeClr val="accent3"/>
+          </a:fillRef>
+          <a:effectRef idx="1">
+            <a:schemeClr val="accent3"/>
+          </a:effectRef>
+          <a:fontRef idx="minor">
+            <a:schemeClr val="dk1"/>
+          </a:fontRef>
+        </p:style>
+        <p:txBody>
+          <a:bodyPr rtlCol="0" anchor="ctr"/>
+          <a:lstStyle/>
+          <a:p>
+            <a:pPr algn="ctr"/>
+            <a:r>
+              <a:rPr lang="en-US" dirty="0" smtClean="0">
+                <a:ln w="0"/>
+                <a:solidFill>
+                  <a:schemeClr val="bg1"/>
+                </a:solidFill>
+                <a:effectLst>
+                  <a:outerShdw blurRad="38100" dist="19050" dir="2700000" algn="tl" rotWithShape="0">
+                    <a:schemeClr val="dk1">
+                      <a:alpha val="40000"/>
+                    </a:schemeClr>
+                  </a:outerShdw>
+                </a:effectLst>
+              </a:rPr>
+              <a:t>Default static Pattern Sequence</a:t>
+            </a:r>
+            <a:endParaRPr lang="en-US" dirty="0" smtClean="0">
+              <a:ln w="0"/>
+              <a:solidFill>
+                <a:schemeClr val="bg1"/>
+              </a:solidFill>
+              <a:effectLst>
+                <a:outerShdw blurRad="38100" dist="19050" dir="2700000" algn="tl" rotWithShape="0">
+                  <a:schemeClr val="dk1">
+                    <a:alpha val="40000"/>
+                  </a:schemeClr>
+                </a:outerShdw>
+              </a:effectLst>
+            </a:endParaRPr>
+          </a:p>
+        </p:txBody>
+      </p:sp>
+      <p:sp>
+        <p:nvSpPr>
+          <p:cNvPr id="58" name="Rounded Rectangle 57"/>
+          <p:cNvSpPr/>
+          <p:nvPr/>
+        </p:nvSpPr>
+        <p:spPr>
+          <a:xfrm>
+            <a:off x="8011174" y="2417068"/>
+            <a:ext cx="2209762" cy="792480"/>
+          </a:xfrm>
+          <a:prstGeom prst="roundRect">
+            <a:avLst>
+              <a:gd name="adj" fmla="val 50000"/>
+            </a:avLst>
+          </a:prstGeom>
+          <a:solidFill>
+            <a:schemeClr val="tx1"/>
+          </a:solidFill>
+          <a:ln>
+            <a:noFill/>
+          </a:ln>
+        </p:spPr>
+        <p:style>
+          <a:lnRef idx="1">
+            <a:schemeClr val="accent3"/>
+          </a:lnRef>
+          <a:fillRef idx="2">
+            <a:schemeClr val="accent3"/>
+          </a:fillRef>
+          <a:effectRef idx="1">
+            <a:schemeClr val="accent3"/>
+          </a:effectRef>
+          <a:fontRef idx="minor">
+            <a:schemeClr val="dk1"/>
+          </a:fontRef>
+        </p:style>
+        <p:txBody>
+          <a:bodyPr rtlCol="0" anchor="ctr"/>
+          <a:lstStyle/>
+          <a:p>
+            <a:pPr algn="ctr"/>
+            <a:r>
+              <a:rPr lang="en-US" dirty="0" smtClean="0">
+                <a:ln w="0"/>
+                <a:solidFill>
+                  <a:schemeClr val="bg1"/>
+                </a:solidFill>
+                <a:effectLst>
+                  <a:outerShdw blurRad="38100" dist="19050" dir="2700000" algn="tl" rotWithShape="0">
+                    <a:schemeClr val="dk1">
+                      <a:alpha val="40000"/>
+                    </a:schemeClr>
+                  </a:outerShdw>
+                </a:effectLst>
+              </a:rPr>
+              <a:t>22x 1-Bit static Grey Code Patterns</a:t>
+            </a:r>
+            <a:endParaRPr lang="en-US" dirty="0" smtClean="0">
+              <a:ln w="0"/>
+              <a:solidFill>
+                <a:schemeClr val="bg1"/>
+              </a:solidFill>
+              <a:effectLst>
+                <a:outerShdw blurRad="38100" dist="19050" dir="2700000" algn="tl" rotWithShape="0">
+                  <a:schemeClr val="dk1">
+                    <a:alpha val="40000"/>
+                  </a:schemeClr>
+                </a:outerShdw>
+              </a:effectLst>
+            </a:endParaRPr>
+          </a:p>
+        </p:txBody>
+      </p:sp>
+      <p:sp>
+        <p:nvSpPr>
+          <p:cNvPr id="59" name="Rounded Rectangle 58"/>
+          <p:cNvSpPr/>
+          <p:nvPr/>
+        </p:nvSpPr>
+        <p:spPr>
+          <a:xfrm>
+            <a:off x="4328078" y="2417068"/>
+            <a:ext cx="2171753" cy="792480"/>
+          </a:xfrm>
+          <a:prstGeom prst="roundRect">
+            <a:avLst>
+              <a:gd name="adj" fmla="val 50000"/>
+            </a:avLst>
+          </a:prstGeom>
+          <a:solidFill>
+            <a:schemeClr val="tx1"/>
+          </a:solidFill>
+          <a:ln>
+            <a:noFill/>
+          </a:ln>
+        </p:spPr>
+        <p:style>
+          <a:lnRef idx="1">
+            <a:schemeClr val="accent3"/>
+          </a:lnRef>
+          <a:fillRef idx="2">
+            <a:schemeClr val="accent3"/>
+          </a:fillRef>
+          <a:effectRef idx="1">
+            <a:schemeClr val="accent3"/>
+          </a:effectRef>
+          <a:fontRef idx="minor">
+            <a:schemeClr val="dk1"/>
+          </a:fontRef>
+        </p:style>
+        <p:txBody>
+          <a:bodyPr rtlCol="0" anchor="ctr"/>
+          <a:lstStyle/>
+          <a:p>
+            <a:pPr algn="ctr"/>
+            <a:r>
+              <a:rPr lang="en-US" dirty="0" smtClean="0">
+                <a:ln w="0"/>
+                <a:solidFill>
+                  <a:schemeClr val="bg1"/>
+                </a:solidFill>
+                <a:effectLst>
+                  <a:outerShdw blurRad="38100" dist="19050" dir="2700000" algn="tl" rotWithShape="0">
+                    <a:schemeClr val="dk1">
+                      <a:alpha val="40000"/>
+                    </a:schemeClr>
+                  </a:outerShdw>
+                </a:effectLst>
+              </a:rPr>
+              <a:t>Default Projector Settings</a:t>
+            </a:r>
+            <a:endParaRPr lang="en-US" dirty="0" smtClean="0">
+              <a:ln w="0"/>
+              <a:solidFill>
+                <a:schemeClr val="bg1"/>
+              </a:solidFill>
+              <a:effectLst>
+                <a:outerShdw blurRad="38100" dist="19050" dir="2700000" algn="tl" rotWithShape="0">
+                  <a:schemeClr val="dk1">
+                    <a:alpha val="40000"/>
+                  </a:schemeClr>
+                </a:outerShdw>
+              </a:effectLst>
+            </a:endParaRPr>
+          </a:p>
+        </p:txBody>
+      </p:sp>
+      <p:sp>
+        <p:nvSpPr>
+          <p:cNvPr id="61" name="Rounded Rectangle 60"/>
+          <p:cNvSpPr/>
+          <p:nvPr/>
+        </p:nvSpPr>
+        <p:spPr>
+          <a:xfrm>
+            <a:off x="7996868" y="3955282"/>
+            <a:ext cx="2238375" cy="792480"/>
+          </a:xfrm>
+          <a:prstGeom prst="roundRect">
+            <a:avLst>
+              <a:gd name="adj" fmla="val 50000"/>
+            </a:avLst>
+          </a:prstGeom>
+          <a:solidFill>
+            <a:schemeClr val="tx1"/>
+          </a:solidFill>
+          <a:ln>
+            <a:noFill/>
+          </a:ln>
+        </p:spPr>
+        <p:style>
+          <a:lnRef idx="1">
+            <a:schemeClr val="accent3"/>
+          </a:lnRef>
+          <a:fillRef idx="2">
+            <a:schemeClr val="accent3"/>
+          </a:fillRef>
+          <a:effectRef idx="1">
+            <a:schemeClr val="accent3"/>
+          </a:effectRef>
+          <a:fontRef idx="minor">
+            <a:schemeClr val="dk1"/>
+          </a:fontRef>
+        </p:style>
+        <p:txBody>
+          <a:bodyPr rtlCol="0" anchor="ctr"/>
+          <a:lstStyle/>
+          <a:p>
+            <a:pPr algn="ctr"/>
+            <a:r>
+              <a:rPr lang="en-US" dirty="0" smtClean="0">
+                <a:ln w="0"/>
+                <a:solidFill>
+                  <a:schemeClr val="bg1"/>
+                </a:solidFill>
+                <a:effectLst>
+                  <a:outerShdw blurRad="38100" dist="19050" dir="2700000" algn="tl" rotWithShape="0">
+                    <a:schemeClr val="dk1">
+                      <a:alpha val="40000"/>
+                    </a:schemeClr>
+                  </a:outerShdw>
+                </a:effectLst>
+              </a:rPr>
+              <a:t>1x 24Bit static</a:t>
+            </a:r>
+          </a:p>
+          <a:p>
+            <a:pPr algn="ctr"/>
+            <a:r>
+              <a:rPr lang="en-US" dirty="0" smtClean="0">
+                <a:ln w="0"/>
+                <a:solidFill>
+                  <a:schemeClr val="bg1"/>
+                </a:solidFill>
+                <a:effectLst>
+                  <a:outerShdw blurRad="38100" dist="19050" dir="2700000" algn="tl" rotWithShape="0">
+                    <a:schemeClr val="dk1">
+                      <a:alpha val="40000"/>
+                    </a:schemeClr>
+                  </a:outerShdw>
+                </a:effectLst>
+              </a:rPr>
+              <a:t>Grey Code BMP</a:t>
+            </a:r>
+            <a:endParaRPr lang="en-US" dirty="0" smtClean="0">
+              <a:ln w="0"/>
+              <a:solidFill>
+                <a:schemeClr val="bg1"/>
+              </a:solidFill>
+              <a:effectLst>
+                <a:outerShdw blurRad="38100" dist="19050" dir="2700000" algn="tl" rotWithShape="0">
+                  <a:schemeClr val="dk1">
+                    <a:alpha val="40000"/>
+                  </a:schemeClr>
+                </a:outerShdw>
+              </a:effectLst>
+            </a:endParaRPr>
+          </a:p>
+        </p:txBody>
+      </p:sp>
+      <p:sp>
+        <p:nvSpPr>
+          <p:cNvPr id="62" name="Rounded Rectangle 61"/>
+          <p:cNvSpPr/>
+          <p:nvPr/>
+        </p:nvSpPr>
+        <p:spPr>
+          <a:xfrm>
+            <a:off x="3565769" y="3958487"/>
+            <a:ext cx="1493521" cy="792480"/>
+          </a:xfrm>
+          <a:prstGeom prst="roundRect">
+            <a:avLst>
+              <a:gd name="adj" fmla="val 50000"/>
+            </a:avLst>
+          </a:prstGeom>
+          <a:solidFill>
+            <a:schemeClr val="tx1"/>
+          </a:solidFill>
+          <a:ln>
+            <a:noFill/>
+          </a:ln>
+        </p:spPr>
+        <p:style>
+          <a:lnRef idx="1">
+            <a:schemeClr val="accent3"/>
+          </a:lnRef>
+          <a:fillRef idx="2">
+            <a:schemeClr val="accent3"/>
+          </a:fillRef>
+          <a:effectRef idx="1">
+            <a:schemeClr val="accent3"/>
+          </a:effectRef>
+          <a:fontRef idx="minor">
+            <a:schemeClr val="dk1"/>
+          </a:fontRef>
+        </p:style>
+        <p:txBody>
+          <a:bodyPr rtlCol="0" anchor="ctr"/>
+          <a:lstStyle/>
+          <a:p>
+            <a:pPr algn="ctr"/>
+            <a:r>
+              <a:rPr lang="en-US" dirty="0" smtClean="0">
+                <a:ln w="0"/>
+                <a:solidFill>
+                  <a:schemeClr val="bg1"/>
+                </a:solidFill>
+                <a:effectLst>
+                  <a:outerShdw blurRad="38100" dist="19050" dir="2700000" algn="tl" rotWithShape="0">
+                    <a:schemeClr val="dk1">
+                      <a:alpha val="40000"/>
+                    </a:schemeClr>
+                  </a:outerShdw>
+                </a:effectLst>
+              </a:rPr>
+              <a:t>Solution/</a:t>
+            </a:r>
+          </a:p>
+          <a:p>
+            <a:pPr algn="ctr"/>
+            <a:r>
+              <a:rPr lang="en-US" dirty="0" smtClean="0">
+                <a:ln w="0"/>
+                <a:solidFill>
+                  <a:schemeClr val="bg1"/>
+                </a:solidFill>
+                <a:effectLst>
+                  <a:outerShdw blurRad="38100" dist="19050" dir="2700000" algn="tl" rotWithShape="0">
+                    <a:schemeClr val="dk1">
+                      <a:alpha val="40000"/>
+                    </a:schemeClr>
+                  </a:outerShdw>
+                </a:effectLst>
+              </a:rPr>
+              <a:t>.</a:t>
+            </a:r>
+            <a:r>
+              <a:rPr lang="en-US" dirty="0" err="1" smtClean="0">
+                <a:ln w="0"/>
+                <a:solidFill>
+                  <a:schemeClr val="bg1"/>
+                </a:solidFill>
+                <a:effectLst>
+                  <a:outerShdw blurRad="38100" dist="19050" dir="2700000" algn="tl" rotWithShape="0">
+                    <a:schemeClr val="dk1">
+                      <a:alpha val="40000"/>
+                    </a:schemeClr>
+                  </a:outerShdw>
+                </a:effectLst>
+              </a:rPr>
+              <a:t>ini</a:t>
+            </a:r>
+            <a:r>
+              <a:rPr lang="en-US" dirty="0" smtClean="0">
+                <a:ln w="0"/>
+                <a:solidFill>
+                  <a:schemeClr val="bg1"/>
+                </a:solidFill>
+                <a:effectLst>
+                  <a:outerShdw blurRad="38100" dist="19050" dir="2700000" algn="tl" rotWithShape="0">
+                    <a:schemeClr val="dk1">
+                      <a:alpha val="40000"/>
+                    </a:schemeClr>
+                  </a:outerShdw>
+                </a:effectLst>
+              </a:rPr>
+              <a:t> File</a:t>
+            </a:r>
+            <a:endParaRPr lang="en-US" dirty="0" smtClean="0">
+              <a:ln w="0"/>
+              <a:solidFill>
+                <a:schemeClr val="bg1"/>
+              </a:solidFill>
+              <a:effectLst>
+                <a:outerShdw blurRad="38100" dist="19050" dir="2700000" algn="tl" rotWithShape="0">
+                  <a:schemeClr val="dk1">
+                    <a:alpha val="40000"/>
+                  </a:schemeClr>
+                </a:outerShdw>
+              </a:effectLst>
+            </a:endParaRPr>
+          </a:p>
+        </p:txBody>
+      </p:sp>
+      <p:cxnSp>
+        <p:nvCxnSpPr>
+          <p:cNvPr id="63" name="Straight Arrow Connector 62"/>
+          <p:cNvCxnSpPr>
+            <a:stCxn id="56" idx="2"/>
+            <a:endCxn id="62" idx="0"/>
+          </p:cNvCxnSpPr>
+          <p:nvPr/>
+        </p:nvCxnSpPr>
+        <p:spPr>
+          <a:xfrm>
+            <a:off x="3209204" y="3209548"/>
+            <a:ext cx="1103326" cy="748939"/>
+          </a:xfrm>
+          <a:prstGeom prst="straightConnector1">
+            <a:avLst/>
+          </a:prstGeom>
+          <a:ln>
+            <a:solidFill>
+              <a:schemeClr val="tx1"/>
+            </a:solidFill>
+            <a:tailEnd type="triangle"/>
+          </a:ln>
+        </p:spPr>
+        <p:style>
+          <a:lnRef idx="1">
+            <a:schemeClr val="accent1"/>
+          </a:lnRef>
+          <a:fillRef idx="0">
+            <a:schemeClr val="accent1"/>
+          </a:fillRef>
+          <a:effectRef idx="0">
+            <a:schemeClr val="accent1"/>
+          </a:effectRef>
+          <a:fontRef idx="minor">
+            <a:schemeClr val="tx1"/>
+          </a:fontRef>
+        </p:style>
+      </p:cxnSp>
+      <p:cxnSp>
+        <p:nvCxnSpPr>
+          <p:cNvPr id="64" name="Straight Arrow Connector 63"/>
+          <p:cNvCxnSpPr>
+            <a:stCxn id="59" idx="2"/>
+            <a:endCxn id="62" idx="0"/>
+          </p:cNvCxnSpPr>
+          <p:nvPr/>
+        </p:nvCxnSpPr>
+        <p:spPr>
+          <a:xfrm flipH="1">
+            <a:off x="4312530" y="3209548"/>
+            <a:ext cx="1101425" cy="748939"/>
+          </a:xfrm>
+          <a:prstGeom prst="straightConnector1">
+            <a:avLst/>
+          </a:prstGeom>
+          <a:ln>
+            <a:solidFill>
+              <a:schemeClr val="tx1"/>
+            </a:solidFill>
+            <a:tailEnd type="triangle"/>
+          </a:ln>
+        </p:spPr>
+        <p:style>
+          <a:lnRef idx="1">
+            <a:schemeClr val="accent1"/>
+          </a:lnRef>
+          <a:fillRef idx="0">
+            <a:schemeClr val="accent1"/>
+          </a:fillRef>
+          <a:effectRef idx="0">
+            <a:schemeClr val="accent1"/>
+          </a:effectRef>
+          <a:fontRef idx="minor">
+            <a:schemeClr val="tx1"/>
+          </a:fontRef>
+        </p:style>
+      </p:cxnSp>
+      <p:sp>
+        <p:nvSpPr>
+          <p:cNvPr id="65" name="Rounded Rectangle 64"/>
+          <p:cNvSpPr/>
+          <p:nvPr/>
+        </p:nvSpPr>
+        <p:spPr>
+          <a:xfrm>
+            <a:off x="5520797" y="5118923"/>
+            <a:ext cx="1354668" cy="792480"/>
+          </a:xfrm>
+          <a:prstGeom prst="roundRect">
+            <a:avLst>
+              <a:gd name="adj" fmla="val 50000"/>
+            </a:avLst>
+          </a:prstGeom>
+          <a:solidFill>
+            <a:schemeClr val="tx1"/>
+          </a:solidFill>
+          <a:ln>
+            <a:noFill/>
+          </a:ln>
+        </p:spPr>
+        <p:style>
+          <a:lnRef idx="1">
+            <a:schemeClr val="accent3"/>
+          </a:lnRef>
+          <a:fillRef idx="2">
+            <a:schemeClr val="accent3"/>
+          </a:fillRef>
+          <a:effectRef idx="1">
+            <a:schemeClr val="accent3"/>
+          </a:effectRef>
+          <a:fontRef idx="minor">
+            <a:schemeClr val="dk1"/>
+          </a:fontRef>
+        </p:style>
+        <p:txBody>
+          <a:bodyPr rtlCol="0" anchor="ctr"/>
+          <a:lstStyle/>
+          <a:p>
+            <a:pPr algn="ctr"/>
+            <a:r>
+              <a:rPr lang="en-US" dirty="0" smtClean="0">
+                <a:ln w="0"/>
+                <a:solidFill>
+                  <a:schemeClr val="bg1"/>
+                </a:solidFill>
+                <a:effectLst>
+                  <a:outerShdw blurRad="38100" dist="19050" dir="2700000" algn="tl" rotWithShape="0">
+                    <a:schemeClr val="dk1">
+                      <a:alpha val="40000"/>
+                    </a:schemeClr>
+                  </a:outerShdw>
+                </a:effectLst>
+              </a:rPr>
+              <a:t>Paper</a:t>
+            </a:r>
+            <a:endParaRPr lang="en-US" dirty="0" smtClean="0">
+              <a:ln w="0"/>
+              <a:solidFill>
+                <a:schemeClr val="bg1"/>
+              </a:solidFill>
+              <a:effectLst>
+                <a:outerShdw blurRad="38100" dist="19050" dir="2700000" algn="tl" rotWithShape="0">
+                  <a:schemeClr val="dk1">
+                    <a:alpha val="40000"/>
+                  </a:schemeClr>
+                </a:outerShdw>
+              </a:effectLst>
+            </a:endParaRPr>
+          </a:p>
+          <a:p>
+            <a:pPr algn="ctr"/>
+            <a:r>
+              <a:rPr lang="en-US" dirty="0" smtClean="0">
+                <a:ln w="0"/>
+                <a:solidFill>
+                  <a:schemeClr val="bg1"/>
+                </a:solidFill>
+                <a:effectLst>
+                  <a:outerShdw blurRad="38100" dist="19050" dir="2700000" algn="tl" rotWithShape="0">
+                    <a:schemeClr val="dk1">
+                      <a:alpha val="40000"/>
+                    </a:schemeClr>
+                  </a:outerShdw>
+                </a:effectLst>
+              </a:rPr>
+              <a:t>Firmware</a:t>
+            </a:r>
+            <a:endParaRPr lang="en-US" dirty="0" smtClean="0">
+              <a:ln w="0"/>
+              <a:solidFill>
+                <a:schemeClr val="bg1"/>
+              </a:solidFill>
+              <a:effectLst>
+                <a:outerShdw blurRad="38100" dist="19050" dir="2700000" algn="tl" rotWithShape="0">
+                  <a:schemeClr val="dk1">
+                    <a:alpha val="40000"/>
+                  </a:schemeClr>
+                </a:outerShdw>
+              </a:effectLst>
+            </a:endParaRPr>
+          </a:p>
+        </p:txBody>
+      </p:sp>
+      <p:cxnSp>
+        <p:nvCxnSpPr>
+          <p:cNvPr id="66" name="Straight Arrow Connector 65"/>
+          <p:cNvCxnSpPr>
+            <a:stCxn id="54" idx="2"/>
+            <a:endCxn id="65" idx="0"/>
+          </p:cNvCxnSpPr>
+          <p:nvPr/>
+        </p:nvCxnSpPr>
+        <p:spPr>
+          <a:xfrm>
+            <a:off x="6198131" y="4747762"/>
+            <a:ext cx="0" cy="371161"/>
+          </a:xfrm>
+          <a:prstGeom prst="straightConnector1">
+            <a:avLst/>
+          </a:prstGeom>
+          <a:ln>
+            <a:solidFill>
+              <a:schemeClr val="tx1"/>
+            </a:solidFill>
+            <a:tailEnd type="triangle"/>
+          </a:ln>
+        </p:spPr>
+        <p:style>
+          <a:lnRef idx="1">
+            <a:schemeClr val="accent1"/>
+          </a:lnRef>
+          <a:fillRef idx="0">
+            <a:schemeClr val="accent1"/>
+          </a:fillRef>
+          <a:effectRef idx="0">
+            <a:schemeClr val="accent1"/>
+          </a:effectRef>
+          <a:fontRef idx="minor">
+            <a:schemeClr val="tx1"/>
+          </a:fontRef>
+        </p:style>
+      </p:cxnSp>
+      <p:cxnSp>
+        <p:nvCxnSpPr>
+          <p:cNvPr id="70" name="Straight Arrow Connector 69"/>
+          <p:cNvCxnSpPr>
+            <a:stCxn id="61" idx="2"/>
+            <a:endCxn id="65" idx="0"/>
+          </p:cNvCxnSpPr>
+          <p:nvPr/>
+        </p:nvCxnSpPr>
+        <p:spPr>
+          <a:xfrm flipH="1">
+            <a:off x="6198131" y="4747762"/>
+            <a:ext cx="2917925" cy="371161"/>
+          </a:xfrm>
+          <a:prstGeom prst="straightConnector1">
+            <a:avLst/>
+          </a:prstGeom>
+          <a:ln>
+            <a:solidFill>
+              <a:schemeClr val="tx1"/>
+            </a:solidFill>
+            <a:tailEnd type="triangle"/>
+          </a:ln>
+        </p:spPr>
+        <p:style>
+          <a:lnRef idx="1">
+            <a:schemeClr val="accent1"/>
+          </a:lnRef>
+          <a:fillRef idx="0">
+            <a:schemeClr val="accent1"/>
+          </a:fillRef>
+          <a:effectRef idx="0">
+            <a:schemeClr val="accent1"/>
+          </a:effectRef>
+          <a:fontRef idx="minor">
+            <a:schemeClr val="tx1"/>
+          </a:fontRef>
+        </p:style>
+      </p:cxnSp>
+      <p:cxnSp>
+        <p:nvCxnSpPr>
+          <p:cNvPr id="72" name="Straight Arrow Connector 71"/>
+          <p:cNvCxnSpPr>
+            <a:stCxn id="58" idx="2"/>
+            <a:endCxn id="61" idx="0"/>
+          </p:cNvCxnSpPr>
+          <p:nvPr/>
+        </p:nvCxnSpPr>
+        <p:spPr>
+          <a:xfrm>
+            <a:off x="9116055" y="3209548"/>
+            <a:ext cx="1" cy="745734"/>
+          </a:xfrm>
+          <a:prstGeom prst="straightConnector1">
+            <a:avLst/>
+          </a:prstGeom>
+          <a:ln>
+            <a:solidFill>
+              <a:schemeClr val="tx1"/>
+            </a:solidFill>
+            <a:tailEnd type="triangle"/>
+          </a:ln>
+        </p:spPr>
+        <p:style>
+          <a:lnRef idx="1">
+            <a:schemeClr val="accent1"/>
+          </a:lnRef>
+          <a:fillRef idx="0">
+            <a:schemeClr val="accent1"/>
+          </a:fillRef>
+          <a:effectRef idx="0">
+            <a:schemeClr val="accent1"/>
+          </a:effectRef>
+          <a:fontRef idx="minor">
+            <a:schemeClr val="tx1"/>
+          </a:fontRef>
+        </p:style>
+      </p:cxnSp>
+      <p:cxnSp>
+        <p:nvCxnSpPr>
+          <p:cNvPr id="75" name="Straight Arrow Connector 74"/>
+          <p:cNvCxnSpPr>
+            <a:stCxn id="62" idx="2"/>
+            <a:endCxn id="65" idx="0"/>
+          </p:cNvCxnSpPr>
+          <p:nvPr/>
+        </p:nvCxnSpPr>
+        <p:spPr>
+          <a:xfrm>
+            <a:off x="4312530" y="4750967"/>
+            <a:ext cx="1885601" cy="367956"/>
+          </a:xfrm>
+          <a:prstGeom prst="straightConnector1">
+            <a:avLst/>
+          </a:prstGeom>
+          <a:ln>
+            <a:solidFill>
+              <a:schemeClr val="tx1"/>
+            </a:solidFill>
+            <a:tailEnd type="triangle"/>
+          </a:ln>
+        </p:spPr>
+        <p:style>
+          <a:lnRef idx="1">
+            <a:schemeClr val="accent1"/>
+          </a:lnRef>
+          <a:fillRef idx="0">
+            <a:schemeClr val="accent1"/>
+          </a:fillRef>
+          <a:effectRef idx="0">
+            <a:schemeClr val="accent1"/>
+          </a:effectRef>
+          <a:fontRef idx="minor">
+            <a:schemeClr val="tx1"/>
+          </a:fontRef>
+        </p:style>
+      </p:cxnSp>
+      <p:cxnSp>
+        <p:nvCxnSpPr>
+          <p:cNvPr id="136" name="Straight Connector 135"/>
+          <p:cNvCxnSpPr>
+            <a:stCxn id="56" idx="1"/>
+            <a:endCxn id="35" idx="1"/>
+          </p:cNvCxnSpPr>
+          <p:nvPr/>
+        </p:nvCxnSpPr>
+        <p:spPr>
+          <a:xfrm flipH="1">
+            <a:off x="1559691" y="2813308"/>
+            <a:ext cx="613794" cy="1315643"/>
+          </a:xfrm>
+          <a:prstGeom prst="line">
+            <a:avLst/>
+          </a:prstGeom>
+        </p:spPr>
+        <p:style>
+          <a:lnRef idx="1">
+            <a:schemeClr val="accent1"/>
+          </a:lnRef>
+          <a:fillRef idx="0">
+            <a:schemeClr val="accent1"/>
+          </a:fillRef>
+          <a:effectRef idx="0">
+            <a:schemeClr val="accent1"/>
+          </a:effectRef>
+          <a:fontRef idx="minor">
+            <a:schemeClr val="tx1"/>
+          </a:fontRef>
+        </p:style>
+      </p:cxnSp>
+      <p:cxnSp>
+        <p:nvCxnSpPr>
+          <p:cNvPr id="139" name="Straight Connector 138"/>
+          <p:cNvCxnSpPr>
+            <a:stCxn id="58" idx="3"/>
+            <a:endCxn id="35" idx="3"/>
+          </p:cNvCxnSpPr>
+          <p:nvPr/>
+        </p:nvCxnSpPr>
+        <p:spPr>
+          <a:xfrm>
+            <a:off x="10220936" y="2813308"/>
+            <a:ext cx="615635" cy="1315643"/>
+          </a:xfrm>
+          <a:prstGeom prst="line">
+            <a:avLst/>
+          </a:prstGeom>
+        </p:spPr>
+        <p:style>
+          <a:lnRef idx="1">
+            <a:schemeClr val="accent1"/>
+          </a:lnRef>
+          <a:fillRef idx="0">
+            <a:schemeClr val="accent1"/>
+          </a:fillRef>
+          <a:effectRef idx="0">
+            <a:schemeClr val="accent1"/>
+          </a:effectRef>
+          <a:fontRef idx="minor">
+            <a:schemeClr val="tx1"/>
+          </a:fontRef>
+        </p:style>
+      </p:cxnSp>
+      <p:cxnSp>
+        <p:nvCxnSpPr>
+          <p:cNvPr id="161" name="Straight Connector 160"/>
+          <p:cNvCxnSpPr>
+            <a:stCxn id="69" idx="1"/>
+            <a:endCxn id="35" idx="1"/>
+          </p:cNvCxnSpPr>
+          <p:nvPr/>
+        </p:nvCxnSpPr>
+        <p:spPr>
+          <a:xfrm>
+            <a:off x="1284581" y="3843865"/>
+            <a:ext cx="275110" cy="285086"/>
+          </a:xfrm>
+          <a:prstGeom prst="line">
+            <a:avLst/>
+          </a:prstGeom>
+        </p:spPr>
+        <p:style>
+          <a:lnRef idx="1">
+            <a:schemeClr val="accent1"/>
+          </a:lnRef>
+          <a:fillRef idx="0">
+            <a:schemeClr val="accent1"/>
+          </a:fillRef>
+          <a:effectRef idx="0">
+            <a:schemeClr val="accent1"/>
+          </a:effectRef>
+          <a:fontRef idx="minor">
+            <a:schemeClr val="tx1"/>
+          </a:fontRef>
+        </p:style>
+      </p:cxnSp>
+      <p:cxnSp>
+        <p:nvCxnSpPr>
+          <p:cNvPr id="164" name="Straight Connector 163"/>
+          <p:cNvCxnSpPr>
+            <a:stCxn id="69" idx="3"/>
+            <a:endCxn id="35" idx="3"/>
+          </p:cNvCxnSpPr>
+          <p:nvPr/>
+        </p:nvCxnSpPr>
+        <p:spPr>
+          <a:xfrm flipH="1">
+            <a:off x="10836571" y="3843865"/>
+            <a:ext cx="275110" cy="285086"/>
+          </a:xfrm>
+          <a:prstGeom prst="line">
+            <a:avLst/>
+          </a:prstGeom>
+        </p:spPr>
+        <p:style>
+          <a:lnRef idx="1">
+            <a:schemeClr val="accent1"/>
+          </a:lnRef>
+          <a:fillRef idx="0">
+            <a:schemeClr val="accent1"/>
+          </a:fillRef>
+          <a:effectRef idx="0">
+            <a:schemeClr val="accent1"/>
+          </a:effectRef>
+          <a:fontRef idx="minor">
+            <a:schemeClr val="tx1"/>
+          </a:fontRef>
+        </p:style>
+      </p:cxnSp>
     </p:spTree>
     <p:extLst>
       <p:ext uri="{BB962C8B-B14F-4D97-AF65-F5344CB8AC3E}">
-        <p14:creationId xmlns:p14="http://schemas.microsoft.com/office/powerpoint/2010/main" val="2512912554"/>
+        <p14:creationId xmlns:p14="http://schemas.microsoft.com/office/powerpoint/2010/main" val="2414472812"/>
       </p:ext>
     </p:extLst>
   </p:cSld>
@@ -5756,13 +6794,13 @@
       </p:grpSpPr>
       <p:sp>
         <p:nvSpPr>
-          <p:cNvPr id="4" name="Rounded Rectangle 3"/>
+          <p:cNvPr id="22" name="Rounded Rectangle 21"/>
           <p:cNvSpPr/>
           <p:nvPr/>
         </p:nvSpPr>
         <p:spPr>
           <a:xfrm>
-            <a:off x="2279650" y="185103"/>
+            <a:off x="2341033" y="3188654"/>
             <a:ext cx="7816850" cy="2132965"/>
           </a:xfrm>
           <a:prstGeom prst="roundRect">
@@ -5820,14 +6858,14 @@
       </p:sp>
       <p:sp>
         <p:nvSpPr>
-          <p:cNvPr id="5" name="Rounded Rectangle 4"/>
+          <p:cNvPr id="23" name="Rounded Rectangle 22"/>
           <p:cNvSpPr/>
           <p:nvPr/>
         </p:nvSpPr>
         <p:spPr>
           <a:xfrm>
-            <a:off x="7974330" y="667704"/>
-            <a:ext cx="1899920" cy="1460500"/>
+            <a:off x="3597698" y="3681521"/>
+            <a:ext cx="5303520" cy="1460500"/>
           </a:xfrm>
           <a:prstGeom prst="roundRect">
             <a:avLst/>
@@ -5868,7 +6906,7 @@
                   <a:schemeClr val="tx1"/>
                 </a:solidFill>
               </a:rPr>
-              <a:t>Static</a:t>
+              <a:t>Dynamic</a:t>
             </a:r>
             <a:endParaRPr lang="en-US" dirty="0">
               <a:solidFill>
@@ -5880,26 +6918,299 @@
       </p:sp>
       <p:sp>
         <p:nvSpPr>
-          <p:cNvPr id="6" name="Rounded Rectangle 5"/>
+          <p:cNvPr id="24" name="Rounded Rectangle 23"/>
           <p:cNvSpPr/>
           <p:nvPr/>
         </p:nvSpPr>
         <p:spPr>
           <a:xfrm>
-            <a:off x="2475230" y="667704"/>
-            <a:ext cx="5303520" cy="1460500"/>
+            <a:off x="5502698" y="4043100"/>
+            <a:ext cx="1493520" cy="792480"/>
           </a:xfrm>
           <a:prstGeom prst="roundRect">
             <a:avLst/>
           </a:prstGeom>
           <a:solidFill>
+            <a:srgbClr val="65A638"/>
+          </a:solidFill>
+        </p:spPr>
+        <p:style>
+          <a:lnRef idx="1">
+            <a:schemeClr val="accent6"/>
+          </a:lnRef>
+          <a:fillRef idx="3">
+            <a:schemeClr val="accent6"/>
+          </a:fillRef>
+          <a:effectRef idx="2">
+            <a:schemeClr val="accent6"/>
+          </a:effectRef>
+          <a:fontRef idx="minor">
+            <a:schemeClr val="lt1"/>
+          </a:fontRef>
+        </p:style>
+        <p:txBody>
+          <a:bodyPr rtlCol="0" anchor="ctr"/>
+          <a:lstStyle/>
+          <a:p>
+            <a:pPr algn="ctr"/>
+            <a:r>
+              <a:rPr lang="en-US" dirty="0" smtClean="0">
+                <a:ln w="0"/>
+                <a:solidFill>
+                  <a:schemeClr val="bg1"/>
+                </a:solidFill>
+                <a:effectLst>
+                  <a:outerShdw blurRad="38100" dist="19050" dir="2700000" algn="tl" rotWithShape="0">
+                    <a:schemeClr val="dk1">
+                      <a:alpha val="40000"/>
+                    </a:schemeClr>
+                  </a:outerShdw>
+                </a:effectLst>
+              </a:rPr>
+              <a:t>Simulated Environment</a:t>
+            </a:r>
+          </a:p>
+        </p:txBody>
+      </p:sp>
+      <p:sp>
+        <p:nvSpPr>
+          <p:cNvPr id="27" name="Title 1"/>
+          <p:cNvSpPr>
+            <a:spLocks noGrp="1"/>
+          </p:cNvSpPr>
+          <p:nvPr>
+            <p:ph type="title"/>
+          </p:nvPr>
+        </p:nvSpPr>
+        <p:spPr>
+          <a:xfrm>
+            <a:off x="320971" y="52413"/>
+            <a:ext cx="10515600" cy="1325563"/>
+          </a:xfrm>
+        </p:spPr>
+        <p:txBody>
+          <a:bodyPr/>
+          <a:lstStyle/>
+          <a:p>
+            <a:r>
+              <a:rPr lang="en-US" dirty="0" smtClean="0"/>
+              <a:t>Replicate Paper </a:t>
+            </a:r>
+            <a:r>
+              <a:rPr lang="en-US" smtClean="0"/>
+              <a:t>– Upload Firmware</a:t>
+            </a:r>
+            <a:endParaRPr lang="en-GB" dirty="0"/>
+          </a:p>
+        </p:txBody>
+      </p:sp>
+    </p:spTree>
+    <p:extLst>
+      <p:ext uri="{BB962C8B-B14F-4D97-AF65-F5344CB8AC3E}">
+        <p14:creationId xmlns:p14="http://schemas.microsoft.com/office/powerpoint/2010/main" val="3971438021"/>
+      </p:ext>
+    </p:extLst>
+  </p:cSld>
+  <p:clrMapOvr>
+    <a:masterClrMapping/>
+  </p:clrMapOvr>
+</p:sld>
+</file>
+
+<file path=ppt/slides/slide4.xml><?xml version="1.0" encoding="utf-8"?>
+<p:sld xmlns:a="http://schemas.openxmlformats.org/drawingml/2006/main" xmlns:r="http://schemas.openxmlformats.org/officeDocument/2006/relationships" xmlns:p="http://schemas.openxmlformats.org/presentationml/2006/main">
+  <p:cSld>
+    <p:spTree>
+      <p:nvGrpSpPr>
+        <p:cNvPr id="1" name=""/>
+        <p:cNvGrpSpPr/>
+        <p:nvPr/>
+      </p:nvGrpSpPr>
+      <p:grpSpPr>
+        <a:xfrm>
+          <a:off x="0" y="0"/>
+          <a:ext cx="0" cy="0"/>
+          <a:chOff x="0" y="0"/>
+          <a:chExt cx="0" cy="0"/>
+        </a:xfrm>
+      </p:grpSpPr>
+      <p:sp>
+        <p:nvSpPr>
+          <p:cNvPr id="5" name="TextBox 4"/>
+          <p:cNvSpPr txBox="1"/>
+          <p:nvPr/>
+        </p:nvSpPr>
+        <p:spPr>
+          <a:xfrm>
+            <a:off x="1130245" y="2884481"/>
+            <a:ext cx="2106154" cy="2862322"/>
+          </a:xfrm>
+          <a:prstGeom prst="rect">
+            <a:avLst/>
+          </a:prstGeom>
+          <a:noFill/>
+        </p:spPr>
+        <p:txBody>
+          <a:bodyPr wrap="none" rtlCol="0">
+            <a:spAutoFit/>
+          </a:bodyPr>
+          <a:lstStyle/>
+          <a:p>
+            <a:r>
+              <a:rPr lang="en-US" b="1" u="sng" dirty="0" smtClean="0"/>
+              <a:t>User Input (?)</a:t>
+            </a:r>
+          </a:p>
+          <a:p>
+            <a:pPr marL="285750" indent="-285750">
+              <a:buFontTx/>
+              <a:buChar char="-"/>
+            </a:pPr>
+            <a:r>
+              <a:rPr lang="en-US" dirty="0" smtClean="0"/>
+              <a:t>Touch</a:t>
+            </a:r>
+            <a:endParaRPr lang="en-US" dirty="0"/>
+          </a:p>
+          <a:p>
+            <a:pPr marL="285750" indent="-285750">
+              <a:buFontTx/>
+              <a:buChar char="-"/>
+            </a:pPr>
+            <a:r>
+              <a:rPr lang="en-US" dirty="0" smtClean="0"/>
+              <a:t>Movement</a:t>
+            </a:r>
+          </a:p>
+          <a:p>
+            <a:pPr marL="742950" lvl="1" indent="-285750">
+              <a:buFontTx/>
+              <a:buChar char="-"/>
+            </a:pPr>
+            <a:r>
+              <a:rPr lang="en-US" dirty="0" smtClean="0"/>
+              <a:t>Planar</a:t>
+            </a:r>
+          </a:p>
+          <a:p>
+            <a:pPr marL="742950" lvl="1" indent="-285750">
+              <a:buFontTx/>
+              <a:buChar char="-"/>
+            </a:pPr>
+            <a:r>
+              <a:rPr lang="en-US" dirty="0" smtClean="0"/>
+              <a:t>Orthogonal</a:t>
+            </a:r>
+            <a:endParaRPr lang="en-US" dirty="0"/>
+          </a:p>
+          <a:p>
+            <a:pPr marL="285750" indent="-285750">
+              <a:buFontTx/>
+              <a:buChar char="-"/>
+            </a:pPr>
+            <a:r>
+              <a:rPr lang="en-US" dirty="0" smtClean="0"/>
+              <a:t>External UI</a:t>
+            </a:r>
+          </a:p>
+          <a:p>
+            <a:pPr marL="742950" lvl="1" indent="-285750">
+              <a:buFontTx/>
+              <a:buChar char="-"/>
+            </a:pPr>
+            <a:r>
+              <a:rPr lang="en-US" dirty="0" smtClean="0"/>
+              <a:t>Buttons</a:t>
+            </a:r>
+          </a:p>
+          <a:p>
+            <a:pPr marL="742950" lvl="1" indent="-285750">
+              <a:buFontTx/>
+              <a:buChar char="-"/>
+            </a:pPr>
+            <a:r>
+              <a:rPr lang="en-US" dirty="0" smtClean="0"/>
+              <a:t>Levers</a:t>
+            </a:r>
+          </a:p>
+          <a:p>
+            <a:pPr marL="742950" lvl="1" indent="-285750">
+              <a:buFontTx/>
+              <a:buChar char="-"/>
+            </a:pPr>
+            <a:r>
+              <a:rPr lang="en-US" dirty="0" smtClean="0"/>
+              <a:t>Encoders</a:t>
+            </a:r>
+          </a:p>
+          <a:p>
+            <a:pPr marL="742950" lvl="1" indent="-285750">
+              <a:buFontTx/>
+              <a:buChar char="-"/>
+            </a:pPr>
+            <a:r>
+              <a:rPr lang="en-US" dirty="0" smtClean="0"/>
+              <a:t>Scroll Wheel</a:t>
+            </a:r>
+          </a:p>
+        </p:txBody>
+      </p:sp>
+    </p:spTree>
+    <p:extLst>
+      <p:ext uri="{BB962C8B-B14F-4D97-AF65-F5344CB8AC3E}">
+        <p14:creationId xmlns:p14="http://schemas.microsoft.com/office/powerpoint/2010/main" val="2512912554"/>
+      </p:ext>
+    </p:extLst>
+  </p:cSld>
+  <p:clrMapOvr>
+    <a:masterClrMapping/>
+  </p:clrMapOvr>
+</p:sld>
+</file>
+
+<file path=ppt/slides/slide5.xml><?xml version="1.0" encoding="utf-8"?>
+<p:sld xmlns:a="http://schemas.openxmlformats.org/drawingml/2006/main" xmlns:r="http://schemas.openxmlformats.org/officeDocument/2006/relationships" xmlns:p="http://schemas.openxmlformats.org/presentationml/2006/main">
+  <p:cSld>
+    <p:spTree>
+      <p:nvGrpSpPr>
+        <p:cNvPr id="1" name=""/>
+        <p:cNvGrpSpPr/>
+        <p:nvPr/>
+      </p:nvGrpSpPr>
+      <p:grpSpPr>
+        <a:xfrm>
+          <a:off x="0" y="0"/>
+          <a:ext cx="0" cy="0"/>
+          <a:chOff x="0" y="0"/>
+          <a:chExt cx="0" cy="0"/>
+        </a:xfrm>
+      </p:grpSpPr>
+      <p:sp>
+        <p:nvSpPr>
+          <p:cNvPr id="4" name="Rounded Rectangle 3"/>
+          <p:cNvSpPr/>
+          <p:nvPr/>
+        </p:nvSpPr>
+        <p:spPr>
+          <a:xfrm>
+            <a:off x="2279650" y="185103"/>
+            <a:ext cx="7816850" cy="2132965"/>
+          </a:xfrm>
+          <a:prstGeom prst="roundRect">
+            <a:avLst/>
+          </a:prstGeom>
+          <a:solidFill>
             <a:schemeClr val="accent6">
-              <a:lumMod val="60000"/>
-              <a:lumOff val="40000"/>
+              <a:lumMod val="20000"/>
+              <a:lumOff val="80000"/>
             </a:schemeClr>
           </a:solidFill>
           <a:ln w="76200">
-            <a:noFill/>
+            <a:solidFill>
+              <a:schemeClr val="accent6">
+                <a:lumMod val="75000"/>
+              </a:schemeClr>
+            </a:solidFill>
           </a:ln>
         </p:spPr>
         <p:style>
@@ -5928,6 +7239,126 @@
                   <a:schemeClr val="tx1"/>
                 </a:solidFill>
               </a:rPr>
+              <a:t>Information</a:t>
+            </a:r>
+            <a:endParaRPr lang="en-US" dirty="0">
+              <a:solidFill>
+                <a:schemeClr val="tx1"/>
+              </a:solidFill>
+            </a:endParaRPr>
+          </a:p>
+        </p:txBody>
+      </p:sp>
+      <p:sp>
+        <p:nvSpPr>
+          <p:cNvPr id="5" name="Rounded Rectangle 4"/>
+          <p:cNvSpPr/>
+          <p:nvPr/>
+        </p:nvSpPr>
+        <p:spPr>
+          <a:xfrm>
+            <a:off x="7974330" y="667704"/>
+            <a:ext cx="1899920" cy="1460500"/>
+          </a:xfrm>
+          <a:prstGeom prst="roundRect">
+            <a:avLst/>
+          </a:prstGeom>
+          <a:solidFill>
+            <a:schemeClr val="accent6">
+              <a:lumMod val="60000"/>
+              <a:lumOff val="40000"/>
+            </a:schemeClr>
+          </a:solidFill>
+          <a:ln w="76200">
+            <a:noFill/>
+          </a:ln>
+        </p:spPr>
+        <p:style>
+          <a:lnRef idx="2">
+            <a:schemeClr val="accent5">
+              <a:shade val="50000"/>
+            </a:schemeClr>
+          </a:lnRef>
+          <a:fillRef idx="1">
+            <a:schemeClr val="accent5"/>
+          </a:fillRef>
+          <a:effectRef idx="0">
+            <a:schemeClr val="accent5"/>
+          </a:effectRef>
+          <a:fontRef idx="minor">
+            <a:schemeClr val="lt1"/>
+          </a:fontRef>
+        </p:style>
+        <p:txBody>
+          <a:bodyPr rtlCol="0" anchor="t"/>
+          <a:lstStyle/>
+          <a:p>
+            <a:r>
+              <a:rPr lang="en-US" dirty="0" smtClean="0">
+                <a:solidFill>
+                  <a:schemeClr val="tx1"/>
+                </a:solidFill>
+              </a:rPr>
+              <a:t>Static</a:t>
+            </a:r>
+            <a:endParaRPr lang="en-US" dirty="0">
+              <a:solidFill>
+                <a:schemeClr val="tx1"/>
+              </a:solidFill>
+            </a:endParaRPr>
+          </a:p>
+        </p:txBody>
+      </p:sp>
+      <p:sp>
+        <p:nvSpPr>
+          <p:cNvPr id="6" name="Rounded Rectangle 5"/>
+          <p:cNvSpPr/>
+          <p:nvPr/>
+        </p:nvSpPr>
+        <p:spPr>
+          <a:xfrm>
+            <a:off x="2475230" y="667704"/>
+            <a:ext cx="5303520" cy="1460500"/>
+          </a:xfrm>
+          <a:prstGeom prst="roundRect">
+            <a:avLst/>
+          </a:prstGeom>
+          <a:solidFill>
+            <a:schemeClr val="accent6">
+              <a:lumMod val="60000"/>
+              <a:lumOff val="40000"/>
+            </a:schemeClr>
+          </a:solidFill>
+          <a:ln w="76200">
+            <a:noFill/>
+          </a:ln>
+        </p:spPr>
+        <p:style>
+          <a:lnRef idx="2">
+            <a:schemeClr val="accent5">
+              <a:shade val="50000"/>
+            </a:schemeClr>
+          </a:lnRef>
+          <a:fillRef idx="1">
+            <a:schemeClr val="accent5"/>
+          </a:fillRef>
+          <a:effectRef idx="0">
+            <a:schemeClr val="accent5"/>
+          </a:effectRef>
+          <a:fontRef idx="minor">
+            <a:schemeClr val="lt1"/>
+          </a:fontRef>
+        </p:style>
+        <p:txBody>
+          <a:bodyPr rtlCol="0" anchor="t"/>
+          <a:lstStyle/>
+          <a:p>
+            <a:r>
+              <a:rPr lang="en-US" dirty="0" smtClean="0">
+                <a:solidFill>
+                  <a:schemeClr val="tx1"/>
+                </a:solidFill>
+              </a:rPr>
               <a:t>Dynamic</a:t>
             </a:r>
             <a:endParaRPr lang="en-US" dirty="0">
@@ -6407,7 +7838,7 @@
 </p:sld>
 </file>
 
-<file path=ppt/slides/slide4.xml><?xml version="1.0" encoding="utf-8"?>
+<file path=ppt/slides/slide6.xml><?xml version="1.0" encoding="utf-8"?>
 <p:sld xmlns:a="http://schemas.openxmlformats.org/drawingml/2006/main" xmlns:r="http://schemas.openxmlformats.org/officeDocument/2006/relationships" xmlns:p="http://schemas.openxmlformats.org/presentationml/2006/main">
   <p:cSld>
     <p:spTree>

</xml_diff>